<commit_message>
231030_new dashboard for Azure
</commit_message>
<xml_diff>
--- a/Desoubzdanne_Denis_4_presentation_112023.pptx
+++ b/Desoubzdanne_Denis_4_presentation_112023.pptx
@@ -5,7 +5,7 @@
     <p:sldMasterId id="2147483648" r:id="rId1"/>
   </p:sldMasterIdLst>
   <p:notesMasterIdLst>
-    <p:notesMasterId r:id="rId24"/>
+    <p:notesMasterId r:id="rId27"/>
   </p:notesMasterIdLst>
   <p:sldIdLst>
     <p:sldId id="281" r:id="rId2"/>
@@ -25,11 +25,14 @@
     <p:sldId id="312" r:id="rId16"/>
     <p:sldId id="313" r:id="rId17"/>
     <p:sldId id="317" r:id="rId18"/>
-    <p:sldId id="315" r:id="rId19"/>
-    <p:sldId id="316" r:id="rId20"/>
-    <p:sldId id="302" r:id="rId21"/>
-    <p:sldId id="303" r:id="rId22"/>
-    <p:sldId id="304" r:id="rId23"/>
+    <p:sldId id="318" r:id="rId19"/>
+    <p:sldId id="319" r:id="rId20"/>
+    <p:sldId id="320" r:id="rId21"/>
+    <p:sldId id="315" r:id="rId22"/>
+    <p:sldId id="316" r:id="rId23"/>
+    <p:sldId id="302" r:id="rId24"/>
+    <p:sldId id="303" r:id="rId25"/>
+    <p:sldId id="304" r:id="rId26"/>
   </p:sldIdLst>
   <p:sldSz cx="12192000" cy="6858000"/>
   <p:notesSz cx="6858000" cy="9144000"/>
@@ -163,8 +166,8 @@
 <pc:chgInfo xmlns:a="http://schemas.openxmlformats.org/drawingml/2006/main" xmlns:r="http://schemas.openxmlformats.org/officeDocument/2006/relationships" xmlns:ac="http://schemas.microsoft.com/office/drawing/2013/main/command" xmlns:pc="http://schemas.microsoft.com/office/powerpoint/2013/main/command">
   <pc:docChgLst>
     <pc:chgData name="Denis Desou" userId="a69457fe66514964" providerId="LiveId" clId="{5A6D929D-A75C-4C2A-8FF0-BBA578C2A9CA}"/>
-    <pc:docChg chg="undo custSel addSld modSld">
-      <pc:chgData name="Denis Desou" userId="a69457fe66514964" providerId="LiveId" clId="{5A6D929D-A75C-4C2A-8FF0-BBA578C2A9CA}" dt="2023-10-25T14:37:15.904" v="1030" actId="20577"/>
+    <pc:docChg chg="undo custSel addSld delSld modSld">
+      <pc:chgData name="Denis Desou" userId="a69457fe66514964" providerId="LiveId" clId="{5A6D929D-A75C-4C2A-8FF0-BBA578C2A9CA}" dt="2023-10-30T01:49:15.692" v="1160" actId="1076"/>
       <pc:docMkLst>
         <pc:docMk/>
       </pc:docMkLst>
@@ -403,7 +406,7 @@
         </pc:picChg>
       </pc:sldChg>
       <pc:sldChg chg="addSp delSp modSp mod">
-        <pc:chgData name="Denis Desou" userId="a69457fe66514964" providerId="LiveId" clId="{5A6D929D-A75C-4C2A-8FF0-BBA578C2A9CA}" dt="2023-10-25T12:56:12.732" v="923" actId="21"/>
+        <pc:chgData name="Denis Desou" userId="a69457fe66514964" providerId="LiveId" clId="{5A6D929D-A75C-4C2A-8FF0-BBA578C2A9CA}" dt="2023-10-30T01:49:15.692" v="1160" actId="1076"/>
         <pc:sldMkLst>
           <pc:docMk/>
           <pc:sldMk cId="931819275" sldId="316"/>
@@ -417,7 +420,7 @@
           </ac:spMkLst>
         </pc:spChg>
         <pc:spChg chg="mod">
-          <ac:chgData name="Denis Desou" userId="a69457fe66514964" providerId="LiveId" clId="{5A6D929D-A75C-4C2A-8FF0-BBA578C2A9CA}" dt="2023-10-25T12:23:56.939" v="45" actId="114"/>
+          <ac:chgData name="Denis Desou" userId="a69457fe66514964" providerId="LiveId" clId="{5A6D929D-A75C-4C2A-8FF0-BBA578C2A9CA}" dt="2023-10-30T01:49:10.342" v="1159" actId="20577"/>
           <ac:spMkLst>
             <pc:docMk/>
             <pc:sldMk cId="931819275" sldId="316"/>
@@ -446,6 +449,14 @@
             <pc:docMk/>
             <pc:sldMk cId="931819275" sldId="316"/>
             <ac:picMk id="2" creationId="{51382FF9-D6A0-02F5-DD22-CDC2F9A11336}"/>
+          </ac:picMkLst>
+        </pc:picChg>
+        <pc:picChg chg="mod">
+          <ac:chgData name="Denis Desou" userId="a69457fe66514964" providerId="LiveId" clId="{5A6D929D-A75C-4C2A-8FF0-BBA578C2A9CA}" dt="2023-10-30T01:49:15.692" v="1160" actId="1076"/>
+          <ac:picMkLst>
+            <pc:docMk/>
+            <pc:sldMk cId="931819275" sldId="316"/>
+            <ac:picMk id="8" creationId="{5056FD3B-7DCC-ED5B-08C3-9FC9BAA274DB}"/>
           </ac:picMkLst>
         </pc:picChg>
       </pc:sldChg>
@@ -495,6 +506,151 @@
             <ac:picMk id="8" creationId="{8B65C329-3117-07B9-A3A7-7714D331C33D}"/>
           </ac:picMkLst>
         </pc:picChg>
+      </pc:sldChg>
+      <pc:sldChg chg="addSp delSp modSp new mod">
+        <pc:chgData name="Denis Desou" userId="a69457fe66514964" providerId="LiveId" clId="{5A6D929D-A75C-4C2A-8FF0-BBA578C2A9CA}" dt="2023-10-30T01:47:01.673" v="1111" actId="732"/>
+        <pc:sldMkLst>
+          <pc:docMk/>
+          <pc:sldMk cId="4231340576" sldId="318"/>
+        </pc:sldMkLst>
+        <pc:spChg chg="add mod">
+          <ac:chgData name="Denis Desou" userId="a69457fe66514964" providerId="LiveId" clId="{5A6D929D-A75C-4C2A-8FF0-BBA578C2A9CA}" dt="2023-10-30T01:42:33.050" v="1063" actId="20577"/>
+          <ac:spMkLst>
+            <pc:docMk/>
+            <pc:sldMk cId="4231340576" sldId="318"/>
+            <ac:spMk id="3" creationId="{CDE42CAD-CE98-F0AB-8DCA-D32E5502C264}"/>
+          </ac:spMkLst>
+        </pc:spChg>
+        <pc:spChg chg="add del mod">
+          <ac:chgData name="Denis Desou" userId="a69457fe66514964" providerId="LiveId" clId="{5A6D929D-A75C-4C2A-8FF0-BBA578C2A9CA}" dt="2023-10-29T22:54:53.567" v="1050"/>
+          <ac:spMkLst>
+            <pc:docMk/>
+            <pc:sldMk cId="4231340576" sldId="318"/>
+            <ac:spMk id="4" creationId="{6FFDF722-146D-E5E3-2D69-F0118131649D}"/>
+          </ac:spMkLst>
+        </pc:spChg>
+        <pc:picChg chg="add mod modCrop">
+          <ac:chgData name="Denis Desou" userId="a69457fe66514964" providerId="LiveId" clId="{5A6D929D-A75C-4C2A-8FF0-BBA578C2A9CA}" dt="2023-10-30T01:46:55.936" v="1110" actId="732"/>
+          <ac:picMkLst>
+            <pc:docMk/>
+            <pc:sldMk cId="4231340576" sldId="318"/>
+            <ac:picMk id="6" creationId="{B2DCDBE2-AA4A-992F-CBF7-0817E6D10D0E}"/>
+          </ac:picMkLst>
+        </pc:picChg>
+        <pc:picChg chg="add del mod">
+          <ac:chgData name="Denis Desou" userId="a69457fe66514964" providerId="LiveId" clId="{5A6D929D-A75C-4C2A-8FF0-BBA578C2A9CA}" dt="2023-10-30T01:42:34.700" v="1065" actId="478"/>
+          <ac:picMkLst>
+            <pc:docMk/>
+            <pc:sldMk cId="4231340576" sldId="318"/>
+            <ac:picMk id="8" creationId="{5C7DC16B-2C32-ADB8-3BE0-F594FE1DDB8B}"/>
+          </ac:picMkLst>
+        </pc:picChg>
+        <pc:picChg chg="add mod modCrop">
+          <ac:chgData name="Denis Desou" userId="a69457fe66514964" providerId="LiveId" clId="{5A6D929D-A75C-4C2A-8FF0-BBA578C2A9CA}" dt="2023-10-30T01:47:01.673" v="1111" actId="732"/>
+          <ac:picMkLst>
+            <pc:docMk/>
+            <pc:sldMk cId="4231340576" sldId="318"/>
+            <ac:picMk id="10" creationId="{2CCF041C-8EFC-AD3F-100B-83A62AC4EE7B}"/>
+          </ac:picMkLst>
+        </pc:picChg>
+      </pc:sldChg>
+      <pc:sldChg chg="addSp modSp new mod">
+        <pc:chgData name="Denis Desou" userId="a69457fe66514964" providerId="LiveId" clId="{5A6D929D-A75C-4C2A-8FF0-BBA578C2A9CA}" dt="2023-10-30T01:46:37.231" v="1109" actId="11529"/>
+        <pc:sldMkLst>
+          <pc:docMk/>
+          <pc:sldMk cId="1784030619" sldId="319"/>
+        </pc:sldMkLst>
+        <pc:spChg chg="add mod">
+          <ac:chgData name="Denis Desou" userId="a69457fe66514964" providerId="LiveId" clId="{5A6D929D-A75C-4C2A-8FF0-BBA578C2A9CA}" dt="2023-10-30T01:43:18.765" v="1095" actId="20577"/>
+          <ac:spMkLst>
+            <pc:docMk/>
+            <pc:sldMk cId="1784030619" sldId="319"/>
+            <ac:spMk id="3" creationId="{B8C7DDD3-7FD0-4CDD-CF90-1EED1516FBCD}"/>
+          </ac:spMkLst>
+        </pc:spChg>
+        <pc:spChg chg="add">
+          <ac:chgData name="Denis Desou" userId="a69457fe66514964" providerId="LiveId" clId="{5A6D929D-A75C-4C2A-8FF0-BBA578C2A9CA}" dt="2023-10-30T01:46:37.231" v="1109" actId="11529"/>
+          <ac:spMkLst>
+            <pc:docMk/>
+            <pc:sldMk cId="1784030619" sldId="319"/>
+            <ac:spMk id="8" creationId="{A112A9DE-CDE1-0937-A822-F68DE20AFF9C}"/>
+          </ac:spMkLst>
+        </pc:spChg>
+        <pc:picChg chg="add mod modCrop">
+          <ac:chgData name="Denis Desou" userId="a69457fe66514964" providerId="LiveId" clId="{5A6D929D-A75C-4C2A-8FF0-BBA578C2A9CA}" dt="2023-10-30T01:46:27.272" v="1108" actId="1076"/>
+          <ac:picMkLst>
+            <pc:docMk/>
+            <pc:sldMk cId="1784030619" sldId="319"/>
+            <ac:picMk id="5" creationId="{D388E5FB-BA89-FD2A-68C8-A2A335B9DBE5}"/>
+          </ac:picMkLst>
+        </pc:picChg>
+        <pc:picChg chg="add mod modCrop">
+          <ac:chgData name="Denis Desou" userId="a69457fe66514964" providerId="LiveId" clId="{5A6D929D-A75C-4C2A-8FF0-BBA578C2A9CA}" dt="2023-10-30T01:46:22.817" v="1107" actId="732"/>
+          <ac:picMkLst>
+            <pc:docMk/>
+            <pc:sldMk cId="1784030619" sldId="319"/>
+            <ac:picMk id="7" creationId="{18231895-E8BD-B9CA-DA3E-BF53FACEDD7C}"/>
+          </ac:picMkLst>
+        </pc:picChg>
+      </pc:sldChg>
+      <pc:sldChg chg="add del">
+        <pc:chgData name="Denis Desou" userId="a69457fe66514964" providerId="LiveId" clId="{5A6D929D-A75C-4C2A-8FF0-BBA578C2A9CA}" dt="2023-10-30T01:42:16.015" v="1057" actId="47"/>
+        <pc:sldMkLst>
+          <pc:docMk/>
+          <pc:sldMk cId="2375199611" sldId="319"/>
+        </pc:sldMkLst>
+      </pc:sldChg>
+      <pc:sldChg chg="add del">
+        <pc:chgData name="Denis Desou" userId="a69457fe66514964" providerId="LiveId" clId="{5A6D929D-A75C-4C2A-8FF0-BBA578C2A9CA}" dt="2023-10-30T01:42:16.015" v="1057" actId="47"/>
+        <pc:sldMkLst>
+          <pc:docMk/>
+          <pc:sldMk cId="526432967" sldId="320"/>
+        </pc:sldMkLst>
+      </pc:sldChg>
+      <pc:sldChg chg="addSp modSp new mod">
+        <pc:chgData name="Denis Desou" userId="a69457fe66514964" providerId="LiveId" clId="{5A6D929D-A75C-4C2A-8FF0-BBA578C2A9CA}" dt="2023-10-30T01:48:56.077" v="1151" actId="20577"/>
+        <pc:sldMkLst>
+          <pc:docMk/>
+          <pc:sldMk cId="1010036798" sldId="320"/>
+        </pc:sldMkLst>
+        <pc:spChg chg="add mod">
+          <ac:chgData name="Denis Desou" userId="a69457fe66514964" providerId="LiveId" clId="{5A6D929D-A75C-4C2A-8FF0-BBA578C2A9CA}" dt="2023-10-30T01:48:56.077" v="1151" actId="20577"/>
+          <ac:spMkLst>
+            <pc:docMk/>
+            <pc:sldMk cId="1010036798" sldId="320"/>
+            <ac:spMk id="7" creationId="{7F345B4B-2004-7BEC-F369-38BF1EEA2630}"/>
+          </ac:spMkLst>
+        </pc:spChg>
+        <pc:picChg chg="add mod modCrop">
+          <ac:chgData name="Denis Desou" userId="a69457fe66514964" providerId="LiveId" clId="{5A6D929D-A75C-4C2A-8FF0-BBA578C2A9CA}" dt="2023-10-30T01:48:31.115" v="1122" actId="732"/>
+          <ac:picMkLst>
+            <pc:docMk/>
+            <pc:sldMk cId="1010036798" sldId="320"/>
+            <ac:picMk id="4" creationId="{764612D7-E249-0C63-FF6A-857F9E40787C}"/>
+          </ac:picMkLst>
+        </pc:picChg>
+        <pc:picChg chg="add mod modCrop">
+          <ac:chgData name="Denis Desou" userId="a69457fe66514964" providerId="LiveId" clId="{5A6D929D-A75C-4C2A-8FF0-BBA578C2A9CA}" dt="2023-10-30T01:48:36.951" v="1124" actId="1076"/>
+          <ac:picMkLst>
+            <pc:docMk/>
+            <pc:sldMk cId="1010036798" sldId="320"/>
+            <ac:picMk id="6" creationId="{8B286C19-4F79-5C29-96AE-1499E25DB96C}"/>
+          </ac:picMkLst>
+        </pc:picChg>
+      </pc:sldChg>
+      <pc:sldChg chg="add del">
+        <pc:chgData name="Denis Desou" userId="a69457fe66514964" providerId="LiveId" clId="{5A6D929D-A75C-4C2A-8FF0-BBA578C2A9CA}" dt="2023-10-30T01:42:16.015" v="1057" actId="47"/>
+        <pc:sldMkLst>
+          <pc:docMk/>
+          <pc:sldMk cId="929500310" sldId="321"/>
+        </pc:sldMkLst>
+      </pc:sldChg>
+      <pc:sldChg chg="add del">
+        <pc:chgData name="Denis Desou" userId="a69457fe66514964" providerId="LiveId" clId="{5A6D929D-A75C-4C2A-8FF0-BBA578C2A9CA}" dt="2023-10-30T01:42:16.015" v="1057" actId="47"/>
+        <pc:sldMkLst>
+          <pc:docMk/>
+          <pc:sldMk cId="2459666412" sldId="322"/>
+        </pc:sldMkLst>
       </pc:sldChg>
     </pc:docChg>
   </pc:docChgLst>
@@ -1728,7 +1884,7 @@
           <a:p>
             <a:fld id="{35E829B0-74B6-44D5-A6F5-86E582A15411}" type="datetimeFigureOut">
               <a:rPr lang="fr-FR" smtClean="0"/>
-              <a:t>25/10/2023</a:t>
+              <a:t>29/10/2023</a:t>
             </a:fld>
             <a:endParaRPr lang="fr-FR"/>
           </a:p>
@@ -2814,7 +2970,7 @@
           <a:p>
             <a:fld id="{3BD5BDF3-ADCD-431B-BFD7-CED12EB2906D}" type="slidenum">
               <a:rPr lang="en-US" smtClean="0"/>
-              <a:t>18</a:t>
+              <a:t>21</a:t>
             </a:fld>
             <a:endParaRPr lang="en-US"/>
           </a:p>
@@ -2923,7 +3079,7 @@
           <a:p>
             <a:fld id="{3BD5BDF3-ADCD-431B-BFD7-CED12EB2906D}" type="slidenum">
               <a:rPr lang="en-US" smtClean="0"/>
-              <a:t>19</a:t>
+              <a:t>22</a:t>
             </a:fld>
             <a:endParaRPr lang="en-US"/>
           </a:p>
@@ -3015,7 +3171,7 @@
           <a:p>
             <a:fld id="{3BD5BDF3-ADCD-431B-BFD7-CED12EB2906D}" type="slidenum">
               <a:rPr lang="en-US" smtClean="0"/>
-              <a:t>20</a:t>
+              <a:t>23</a:t>
             </a:fld>
             <a:endParaRPr lang="en-US"/>
           </a:p>
@@ -3124,7 +3280,7 @@
           <a:p>
             <a:fld id="{3BD5BDF3-ADCD-431B-BFD7-CED12EB2906D}" type="slidenum">
               <a:rPr lang="en-US" smtClean="0"/>
-              <a:t>21</a:t>
+              <a:t>24</a:t>
             </a:fld>
             <a:endParaRPr lang="en-US"/>
           </a:p>
@@ -3342,7 +3498,7 @@
           <a:p>
             <a:fld id="{3BD5BDF3-ADCD-431B-BFD7-CED12EB2906D}" type="slidenum">
               <a:rPr lang="en-US" smtClean="0"/>
-              <a:t>22</a:t>
+              <a:t>25</a:t>
             </a:fld>
             <a:endParaRPr lang="en-US"/>
           </a:p>
@@ -13048,83 +13204,151 @@
       </p:grpSpPr>
       <p:sp>
         <p:nvSpPr>
-          <p:cNvPr id="4" name="Title 3"/>
+          <p:cNvPr id="2" name="Espace réservé du numéro de diapositive 1">
+            <a:extLst>
+              <a:ext uri="{FF2B5EF4-FFF2-40B4-BE49-F238E27FC236}">
+                <a16:creationId xmlns:a16="http://schemas.microsoft.com/office/drawing/2014/main" id="{CC6414C3-B1DB-9BC1-E282-9BD9E9771475}"/>
+              </a:ext>
+            </a:extLst>
+          </p:cNvPr>
           <p:cNvSpPr>
             <a:spLocks noGrp="1"/>
           </p:cNvSpPr>
           <p:nvPr>
-            <p:ph type="title"/>
-          </p:nvPr>
+            <p:ph type="sldNum" sz="quarter" idx="12"/>
+          </p:nvPr>
+        </p:nvSpPr>
+        <p:spPr/>
+        <p:txBody>
+          <a:bodyPr/>
+          <a:lstStyle/>
+          <a:p>
+            <a:fld id="{C4E9C214-CE6A-4808-AC62-2B5E6234CBA8}" type="slidenum">
+              <a:rPr lang="fr-FR" smtClean="0"/>
+              <a:t>18</a:t>
+            </a:fld>
+            <a:endParaRPr lang="fr-FR"/>
+          </a:p>
+        </p:txBody>
+      </p:sp>
+      <p:sp>
+        <p:nvSpPr>
+          <p:cNvPr id="3" name="Title 5">
+            <a:extLst>
+              <a:ext uri="{FF2B5EF4-FFF2-40B4-BE49-F238E27FC236}">
+                <a16:creationId xmlns:a16="http://schemas.microsoft.com/office/drawing/2014/main" id="{CDE42CAD-CE98-F0AB-8DCA-D32E5502C264}"/>
+              </a:ext>
+            </a:extLst>
+          </p:cNvPr>
+          <p:cNvSpPr txBox="1">
+            <a:spLocks/>
+          </p:cNvSpPr>
+          <p:nvPr/>
         </p:nvSpPr>
         <p:spPr>
           <a:xfrm>
-            <a:off x="831849" y="1709738"/>
-            <a:ext cx="10768479" cy="2852737"/>
+            <a:off x="838200" y="136525"/>
+            <a:ext cx="10515600" cy="840230"/>
           </a:xfrm>
+          <a:prstGeom prst="rect">
+            <a:avLst/>
+          </a:prstGeom>
         </p:spPr>
         <p:txBody>
-          <a:bodyPr>
-            <a:noAutofit/>
-          </a:bodyPr>
-          <a:lstStyle/>
-          <a:p>
-            <a:r>
-              <a:rPr lang="en-US" dirty="0" err="1">
+          <a:bodyPr/>
+          <a:lstStyle>
+            <a:lvl1pPr algn="l" defTabSz="914400" rtl="0" eaLnBrk="1" latinLnBrk="0" hangingPunct="1">
+              <a:lnSpc>
+                <a:spcPct val="90000"/>
+              </a:lnSpc>
+              <a:spcBef>
+                <a:spcPct val="0"/>
+              </a:spcBef>
+              <a:buNone/>
+              <a:defRPr sz="4400" kern="1200">
+                <a:solidFill>
+                  <a:schemeClr val="tx1"/>
+                </a:solidFill>
+                <a:latin typeface="+mj-lt"/>
+                <a:ea typeface="+mj-ea"/>
+                <a:cs typeface="+mj-cs"/>
+              </a:defRPr>
+            </a:lvl1pPr>
+          </a:lstStyle>
+          <a:p>
+            <a:r>
+              <a:rPr lang="en-US" i="1" dirty="0">
                 <a:solidFill>
                   <a:srgbClr val="7451EB"/>
                 </a:solidFill>
               </a:rPr>
-              <a:t>Démonstration</a:t>
-            </a:r>
-            <a:r>
-              <a:rPr lang="en-US" dirty="0">
-                <a:solidFill>
-                  <a:srgbClr val="7451EB"/>
-                </a:solidFill>
-              </a:rPr>
-              <a:t> du </a:t>
-            </a:r>
-            <a:r>
-              <a:rPr lang="en-US" i="1" dirty="0">
-                <a:solidFill>
-                  <a:srgbClr val="7451EB"/>
-                </a:solidFill>
-              </a:rPr>
-              <a:t>dashboard</a:t>
-            </a:r>
-          </a:p>
-        </p:txBody>
-      </p:sp>
-      <p:sp>
-        <p:nvSpPr>
-          <p:cNvPr id="5" name="Text Placeholder 4"/>
-          <p:cNvSpPr>
-            <a:spLocks noGrp="1"/>
-          </p:cNvSpPr>
-          <p:nvPr>
-            <p:ph type="body" sz="quarter" idx="14"/>
-          </p:nvPr>
-        </p:nvSpPr>
-        <p:spPr/>
-        <p:txBody>
-          <a:bodyPr/>
-          <a:lstStyle/>
-          <a:p>
-            <a:r>
-              <a:rPr lang="en-US" dirty="0">
-                <a:solidFill>
-                  <a:srgbClr val="7451EB"/>
-                </a:solidFill>
-              </a:rPr>
-              <a:t>05</a:t>
-            </a:r>
-          </a:p>
-        </p:txBody>
-      </p:sp>
+              <a:t>Docker images</a:t>
+            </a:r>
+          </a:p>
+        </p:txBody>
+      </p:sp>
+      <p:pic>
+        <p:nvPicPr>
+          <p:cNvPr id="6" name="Image 5">
+            <a:extLst>
+              <a:ext uri="{FF2B5EF4-FFF2-40B4-BE49-F238E27FC236}">
+                <a16:creationId xmlns:a16="http://schemas.microsoft.com/office/drawing/2014/main" id="{B2DCDBE2-AA4A-992F-CBF7-0817E6D10D0E}"/>
+              </a:ext>
+            </a:extLst>
+          </p:cNvPr>
+          <p:cNvPicPr>
+            <a:picLocks noChangeAspect="1"/>
+          </p:cNvPicPr>
+          <p:nvPr/>
+        </p:nvPicPr>
+        <p:blipFill rotWithShape="1">
+          <a:blip r:embed="rId2"/>
+          <a:srcRect b="6139"/>
+          <a:stretch/>
+        </p:blipFill>
+        <p:spPr>
+          <a:xfrm>
+            <a:off x="143436" y="809624"/>
+            <a:ext cx="5971491" cy="3152776"/>
+          </a:xfrm>
+          <a:prstGeom prst="rect">
+            <a:avLst/>
+          </a:prstGeom>
+        </p:spPr>
+      </p:pic>
+      <p:pic>
+        <p:nvPicPr>
+          <p:cNvPr id="10" name="Image 9">
+            <a:extLst>
+              <a:ext uri="{FF2B5EF4-FFF2-40B4-BE49-F238E27FC236}">
+                <a16:creationId xmlns:a16="http://schemas.microsoft.com/office/drawing/2014/main" id="{2CCF041C-8EFC-AD3F-100B-83A62AC4EE7B}"/>
+              </a:ext>
+            </a:extLst>
+          </p:cNvPr>
+          <p:cNvPicPr>
+            <a:picLocks noChangeAspect="1"/>
+          </p:cNvPicPr>
+          <p:nvPr/>
+        </p:nvPicPr>
+        <p:blipFill rotWithShape="1">
+          <a:blip r:embed="rId3"/>
+          <a:srcRect b="5220"/>
+          <a:stretch/>
+        </p:blipFill>
+        <p:spPr>
+          <a:xfrm>
+            <a:off x="6275294" y="2644587"/>
+            <a:ext cx="5801163" cy="3092825"/>
+          </a:xfrm>
+          <a:prstGeom prst="rect">
+            <a:avLst/>
+          </a:prstGeom>
+        </p:spPr>
+      </p:pic>
     </p:spTree>
     <p:extLst>
       <p:ext uri="{BB962C8B-B14F-4D97-AF65-F5344CB8AC3E}">
-        <p14:creationId xmlns:p14="http://schemas.microsoft.com/office/powerpoint/2010/main" val="1716022605"/>
+        <p14:creationId xmlns:p14="http://schemas.microsoft.com/office/powerpoint/2010/main" val="4231340576"/>
       </p:ext>
     </p:extLst>
   </p:cSld>
@@ -13153,23 +13377,77 @@
       </p:grpSpPr>
       <p:sp>
         <p:nvSpPr>
-          <p:cNvPr id="6" name="Title 5"/>
+          <p:cNvPr id="2" name="Espace réservé du numéro de diapositive 1">
+            <a:extLst>
+              <a:ext uri="{FF2B5EF4-FFF2-40B4-BE49-F238E27FC236}">
+                <a16:creationId xmlns:a16="http://schemas.microsoft.com/office/drawing/2014/main" id="{7BA69AD3-D54E-FB03-F553-0977447C3810}"/>
+              </a:ext>
+            </a:extLst>
+          </p:cNvPr>
           <p:cNvSpPr>
             <a:spLocks noGrp="1"/>
           </p:cNvSpPr>
           <p:nvPr>
-            <p:ph type="title"/>
-          </p:nvPr>
+            <p:ph type="sldNum" sz="quarter" idx="12"/>
+          </p:nvPr>
+        </p:nvSpPr>
+        <p:spPr/>
+        <p:txBody>
+          <a:bodyPr/>
+          <a:lstStyle/>
+          <a:p>
+            <a:fld id="{C4E9C214-CE6A-4808-AC62-2B5E6234CBA8}" type="slidenum">
+              <a:rPr lang="fr-FR" smtClean="0"/>
+              <a:t>19</a:t>
+            </a:fld>
+            <a:endParaRPr lang="fr-FR"/>
+          </a:p>
+        </p:txBody>
+      </p:sp>
+      <p:sp>
+        <p:nvSpPr>
+          <p:cNvPr id="3" name="Title 5">
+            <a:extLst>
+              <a:ext uri="{FF2B5EF4-FFF2-40B4-BE49-F238E27FC236}">
+                <a16:creationId xmlns:a16="http://schemas.microsoft.com/office/drawing/2014/main" id="{B8C7DDD3-7FD0-4CDD-CF90-1EED1516FBCD}"/>
+              </a:ext>
+            </a:extLst>
+          </p:cNvPr>
+          <p:cNvSpPr txBox="1">
+            <a:spLocks/>
+          </p:cNvSpPr>
+          <p:nvPr/>
         </p:nvSpPr>
         <p:spPr>
           <a:xfrm>
             <a:off x="838200" y="136525"/>
             <a:ext cx="10515600" cy="840230"/>
           </a:xfrm>
+          <a:prstGeom prst="rect">
+            <a:avLst/>
+          </a:prstGeom>
         </p:spPr>
         <p:txBody>
           <a:bodyPr/>
-          <a:lstStyle/>
+          <a:lstStyle>
+            <a:lvl1pPr algn="l" defTabSz="914400" rtl="0" eaLnBrk="1" latinLnBrk="0" hangingPunct="1">
+              <a:lnSpc>
+                <a:spcPct val="90000"/>
+              </a:lnSpc>
+              <a:spcBef>
+                <a:spcPct val="0"/>
+              </a:spcBef>
+              <a:buNone/>
+              <a:defRPr sz="4400" kern="1200">
+                <a:solidFill>
+                  <a:schemeClr val="tx1"/>
+                </a:solidFill>
+                <a:latin typeface="+mj-lt"/>
+                <a:ea typeface="+mj-ea"/>
+                <a:cs typeface="+mj-cs"/>
+              </a:defRPr>
+            </a:lvl1pPr>
+          </a:lstStyle>
           <a:p>
             <a:r>
               <a:rPr lang="en-US" i="1" dirty="0">
@@ -13177,61 +13455,75 @@
                   <a:srgbClr val="7451EB"/>
                 </a:solidFill>
               </a:rPr>
-              <a:t>Dashboard</a:t>
-            </a:r>
-            <a:r>
-              <a:rPr lang="en-US" dirty="0">
-                <a:solidFill>
-                  <a:srgbClr val="7451EB"/>
-                </a:solidFill>
-              </a:rPr>
-              <a:t> </a:t>
-            </a:r>
-            <a:r>
-              <a:rPr lang="en-US" dirty="0" err="1">
-                <a:solidFill>
-                  <a:srgbClr val="7451EB"/>
-                </a:solidFill>
-              </a:rPr>
-              <a:t>interactif</a:t>
-            </a:r>
-            <a:endParaRPr lang="en-US" i="1" dirty="0">
-              <a:solidFill>
-                <a:srgbClr val="7451EB"/>
-              </a:solidFill>
-            </a:endParaRPr>
-          </a:p>
-        </p:txBody>
-      </p:sp>
-      <p:sp>
-        <p:nvSpPr>
-          <p:cNvPr id="3" name="Slide Number Placeholder 2"/>
-          <p:cNvSpPr>
-            <a:spLocks noGrp="1"/>
-          </p:cNvSpPr>
-          <p:nvPr>
-            <p:ph type="sldNum" sz="quarter" idx="12"/>
-          </p:nvPr>
-        </p:nvSpPr>
-        <p:spPr/>
-        <p:txBody>
-          <a:bodyPr/>
-          <a:lstStyle/>
-          <a:p>
-            <a:fld id="{5F0F63B7-4FB4-4E2A-B819-D713A3D928AD}" type="slidenum">
-              <a:rPr lang="en-US" smtClean="0"/>
-              <a:t>19</a:t>
-            </a:fld>
-            <a:endParaRPr lang="en-US" dirty="0"/>
-          </a:p>
-        </p:txBody>
-      </p:sp>
-      <p:sp useBgFill="1">
-        <p:nvSpPr>
-          <p:cNvPr id="5" name="Rectangle 4">
+              <a:t>Versioning : GitHub</a:t>
+            </a:r>
+          </a:p>
+        </p:txBody>
+      </p:sp>
+      <p:pic>
+        <p:nvPicPr>
+          <p:cNvPr id="5" name="Image 4">
             <a:extLst>
               <a:ext uri="{FF2B5EF4-FFF2-40B4-BE49-F238E27FC236}">
-                <a16:creationId xmlns:a16="http://schemas.microsoft.com/office/drawing/2014/main" id="{50832FC2-2811-9BB3-75AD-BD5D3E07CC84}"/>
+                <a16:creationId xmlns:a16="http://schemas.microsoft.com/office/drawing/2014/main" id="{D388E5FB-BA89-FD2A-68C8-A2A335B9DBE5}"/>
+              </a:ext>
+            </a:extLst>
+          </p:cNvPr>
+          <p:cNvPicPr>
+            <a:picLocks noChangeAspect="1"/>
+          </p:cNvPicPr>
+          <p:nvPr/>
+        </p:nvPicPr>
+        <p:blipFill rotWithShape="1">
+          <a:blip r:embed="rId2"/>
+          <a:srcRect r="74074" b="56805"/>
+          <a:stretch/>
+        </p:blipFill>
+        <p:spPr>
+          <a:xfrm>
+            <a:off x="152400" y="2112309"/>
+            <a:ext cx="1658471" cy="1554257"/>
+          </a:xfrm>
+          <a:prstGeom prst="rect">
+            <a:avLst/>
+          </a:prstGeom>
+        </p:spPr>
+      </p:pic>
+      <p:pic>
+        <p:nvPicPr>
+          <p:cNvPr id="7" name="Image 6">
+            <a:extLst>
+              <a:ext uri="{FF2B5EF4-FFF2-40B4-BE49-F238E27FC236}">
+                <a16:creationId xmlns:a16="http://schemas.microsoft.com/office/drawing/2014/main" id="{18231895-E8BD-B9CA-DA3E-BF53FACEDD7C}"/>
+              </a:ext>
+            </a:extLst>
+          </p:cNvPr>
+          <p:cNvPicPr>
+            <a:picLocks noChangeAspect="1"/>
+          </p:cNvPicPr>
+          <p:nvPr/>
+        </p:nvPicPr>
+        <p:blipFill rotWithShape="1">
+          <a:blip r:embed="rId3"/>
+          <a:srcRect t="12560" b="5797"/>
+          <a:stretch/>
+        </p:blipFill>
+        <p:spPr>
+          <a:xfrm>
+            <a:off x="5145740" y="2052917"/>
+            <a:ext cx="6598024" cy="3030071"/>
+          </a:xfrm>
+          <a:prstGeom prst="rect">
+            <a:avLst/>
+          </a:prstGeom>
+        </p:spPr>
+      </p:pic>
+      <p:sp>
+        <p:nvSpPr>
+          <p:cNvPr id="8" name="Flèche : droite 7">
+            <a:extLst>
+              <a:ext uri="{FF2B5EF4-FFF2-40B4-BE49-F238E27FC236}">
+                <a16:creationId xmlns:a16="http://schemas.microsoft.com/office/drawing/2014/main" id="{A112A9DE-CDE1-0937-A822-F68DE20AFF9C}"/>
               </a:ext>
             </a:extLst>
           </p:cNvPr>
@@ -13240,20 +13532,17 @@
         </p:nvSpPr>
         <p:spPr>
           <a:xfrm>
-            <a:off x="7252447" y="6356350"/>
-            <a:ext cx="663388" cy="365125"/>
+            <a:off x="2698376" y="2635624"/>
+            <a:ext cx="1622612" cy="510988"/>
           </a:xfrm>
-          <a:prstGeom prst="rect">
+          <a:prstGeom prst="rightArrow">
             <a:avLst/>
           </a:prstGeom>
-          <a:ln>
-            <a:noFill/>
-          </a:ln>
         </p:spPr>
         <p:style>
           <a:lnRef idx="2">
             <a:schemeClr val="accent1">
-              <a:shade val="50000"/>
+              <a:shade val="15000"/>
             </a:schemeClr>
           </a:lnRef>
           <a:fillRef idx="1">
@@ -13275,40 +13564,10 @@
           </a:p>
         </p:txBody>
       </p:sp>
-      <p:pic>
-        <p:nvPicPr>
-          <p:cNvPr id="8" name="Image 7">
-            <a:extLst>
-              <a:ext uri="{FF2B5EF4-FFF2-40B4-BE49-F238E27FC236}">
-                <a16:creationId xmlns:a16="http://schemas.microsoft.com/office/drawing/2014/main" id="{5056FD3B-7DCC-ED5B-08C3-9FC9BAA274DB}"/>
-              </a:ext>
-            </a:extLst>
-          </p:cNvPr>
-          <p:cNvPicPr>
-            <a:picLocks noChangeAspect="1"/>
-          </p:cNvPicPr>
-          <p:nvPr/>
-        </p:nvPicPr>
-        <p:blipFill>
-          <a:blip r:embed="rId3"/>
-          <a:stretch>
-            <a:fillRect/>
-          </a:stretch>
-        </p:blipFill>
-        <p:spPr>
-          <a:xfrm>
-            <a:off x="1135380" y="933450"/>
-            <a:ext cx="9921240" cy="4991100"/>
-          </a:xfrm>
-          <a:prstGeom prst="rect">
-            <a:avLst/>
-          </a:prstGeom>
-        </p:spPr>
-      </p:pic>
     </p:spTree>
     <p:extLst>
       <p:ext uri="{BB962C8B-B14F-4D97-AF65-F5344CB8AC3E}">
-        <p14:creationId xmlns:p14="http://schemas.microsoft.com/office/powerpoint/2010/main" val="931819275"/>
+        <p14:creationId xmlns:p14="http://schemas.microsoft.com/office/powerpoint/2010/main" val="1784030619"/>
       </p:ext>
     </p:extLst>
   </p:cSld>
@@ -13718,64 +13977,143 @@
       </p:grpSpPr>
       <p:sp>
         <p:nvSpPr>
-          <p:cNvPr id="4" name="Title 3"/>
+          <p:cNvPr id="2" name="Espace réservé du numéro de diapositive 1">
+            <a:extLst>
+              <a:ext uri="{FF2B5EF4-FFF2-40B4-BE49-F238E27FC236}">
+                <a16:creationId xmlns:a16="http://schemas.microsoft.com/office/drawing/2014/main" id="{E4C6D139-638B-8187-8A0C-FE0B512D13D9}"/>
+              </a:ext>
+            </a:extLst>
+          </p:cNvPr>
           <p:cNvSpPr>
             <a:spLocks noGrp="1"/>
           </p:cNvSpPr>
           <p:nvPr>
-            <p:ph type="title"/>
-          </p:nvPr>
-        </p:nvSpPr>
+            <p:ph type="sldNum" sz="quarter" idx="12"/>
+          </p:nvPr>
+        </p:nvSpPr>
+        <p:spPr/>
+        <p:txBody>
+          <a:bodyPr/>
+          <a:lstStyle/>
+          <a:p>
+            <a:fld id="{C4E9C214-CE6A-4808-AC62-2B5E6234CBA8}" type="slidenum">
+              <a:rPr lang="fr-FR" smtClean="0"/>
+              <a:t>20</a:t>
+            </a:fld>
+            <a:endParaRPr lang="fr-FR"/>
+          </a:p>
+        </p:txBody>
+      </p:sp>
+      <p:pic>
+        <p:nvPicPr>
+          <p:cNvPr id="4" name="Image 3">
+            <a:extLst>
+              <a:ext uri="{FF2B5EF4-FFF2-40B4-BE49-F238E27FC236}">
+                <a16:creationId xmlns:a16="http://schemas.microsoft.com/office/drawing/2014/main" id="{764612D7-E249-0C63-FF6A-857F9E40787C}"/>
+              </a:ext>
+            </a:extLst>
+          </p:cNvPr>
+          <p:cNvPicPr>
+            <a:picLocks noChangeAspect="1"/>
+          </p:cNvPicPr>
+          <p:nvPr/>
+        </p:nvPicPr>
+        <p:blipFill rotWithShape="1">
+          <a:blip r:embed="rId2"/>
+          <a:srcRect t="14254" b="5532"/>
+          <a:stretch/>
+        </p:blipFill>
         <p:spPr>
           <a:xfrm>
-            <a:off x="831849" y="1709738"/>
-            <a:ext cx="10768479" cy="2852737"/>
+            <a:off x="5746377" y="3729318"/>
+            <a:ext cx="6338047" cy="2859741"/>
           </a:xfrm>
+          <a:prstGeom prst="rect">
+            <a:avLst/>
+          </a:prstGeom>
         </p:spPr>
-        <p:txBody>
-          <a:bodyPr>
-            <a:noAutofit/>
-          </a:bodyPr>
-          <a:lstStyle/>
-          <a:p>
-            <a:r>
-              <a:rPr lang="en-US" dirty="0">
+      </p:pic>
+      <p:pic>
+        <p:nvPicPr>
+          <p:cNvPr id="6" name="Image 5">
+            <a:extLst>
+              <a:ext uri="{FF2B5EF4-FFF2-40B4-BE49-F238E27FC236}">
+                <a16:creationId xmlns:a16="http://schemas.microsoft.com/office/drawing/2014/main" id="{8B286C19-4F79-5C29-96AE-1499E25DB96C}"/>
+              </a:ext>
+            </a:extLst>
+          </p:cNvPr>
+          <p:cNvPicPr>
+            <a:picLocks noChangeAspect="1"/>
+          </p:cNvPicPr>
+          <p:nvPr/>
+        </p:nvPicPr>
+        <p:blipFill rotWithShape="1">
+          <a:blip r:embed="rId3"/>
+          <a:srcRect t="12634" b="6090"/>
+          <a:stretch/>
+        </p:blipFill>
+        <p:spPr>
+          <a:xfrm>
+            <a:off x="197223" y="1084730"/>
+            <a:ext cx="5531224" cy="2528769"/>
+          </a:xfrm>
+          <a:prstGeom prst="rect">
+            <a:avLst/>
+          </a:prstGeom>
+        </p:spPr>
+      </p:pic>
+      <p:sp>
+        <p:nvSpPr>
+          <p:cNvPr id="7" name="Title 5">
+            <a:extLst>
+              <a:ext uri="{FF2B5EF4-FFF2-40B4-BE49-F238E27FC236}">
+                <a16:creationId xmlns:a16="http://schemas.microsoft.com/office/drawing/2014/main" id="{7F345B4B-2004-7BEC-F369-38BF1EEA2630}"/>
+              </a:ext>
+            </a:extLst>
+          </p:cNvPr>
+          <p:cNvSpPr txBox="1">
+            <a:spLocks/>
+          </p:cNvSpPr>
+          <p:nvPr/>
+        </p:nvSpPr>
+        <p:spPr>
+          <a:xfrm>
+            <a:off x="838200" y="136525"/>
+            <a:ext cx="10515600" cy="840230"/>
+          </a:xfrm>
+          <a:prstGeom prst="rect">
+            <a:avLst/>
+          </a:prstGeom>
+        </p:spPr>
+        <p:txBody>
+          <a:bodyPr/>
+          <a:lstStyle>
+            <a:lvl1pPr algn="l" defTabSz="914400" rtl="0" eaLnBrk="1" latinLnBrk="0" hangingPunct="1">
+              <a:lnSpc>
+                <a:spcPct val="90000"/>
+              </a:lnSpc>
+              <a:spcBef>
+                <a:spcPct val="0"/>
+              </a:spcBef>
+              <a:buNone/>
+              <a:defRPr sz="4400" kern="1200">
+                <a:solidFill>
+                  <a:schemeClr val="tx1"/>
+                </a:solidFill>
+                <a:latin typeface="+mj-lt"/>
+                <a:ea typeface="+mj-ea"/>
+                <a:cs typeface="+mj-cs"/>
+              </a:defRPr>
+            </a:lvl1pPr>
+          </a:lstStyle>
+          <a:p>
+            <a:r>
+              <a:rPr lang="en-US" i="1" dirty="0">
                 <a:solidFill>
                   <a:srgbClr val="7451EB"/>
                 </a:solidFill>
               </a:rPr>
-              <a:t>Conclusion &amp; perspectives</a:t>
-            </a:r>
-            <a:endParaRPr lang="en-US" i="1" dirty="0">
-              <a:solidFill>
-                <a:srgbClr val="7451EB"/>
-              </a:solidFill>
-            </a:endParaRPr>
-          </a:p>
-        </p:txBody>
-      </p:sp>
-      <p:sp>
-        <p:nvSpPr>
-          <p:cNvPr id="5" name="Text Placeholder 4"/>
-          <p:cNvSpPr>
-            <a:spLocks noGrp="1"/>
-          </p:cNvSpPr>
-          <p:nvPr>
-            <p:ph type="body" sz="quarter" idx="14"/>
-          </p:nvPr>
-        </p:nvSpPr>
-        <p:spPr/>
-        <p:txBody>
-          <a:bodyPr/>
-          <a:lstStyle/>
-          <a:p>
-            <a:r>
-              <a:rPr lang="en-US" dirty="0">
-                <a:solidFill>
-                  <a:srgbClr val="7451EB"/>
-                </a:solidFill>
-              </a:rPr>
-              <a:t>06</a:t>
+              <a:t>Deployment : Azure</a:t>
             </a:r>
           </a:p>
         </p:txBody>
@@ -13783,7 +14121,7 @@
     </p:spTree>
     <p:extLst>
       <p:ext uri="{BB962C8B-B14F-4D97-AF65-F5344CB8AC3E}">
-        <p14:creationId xmlns:p14="http://schemas.microsoft.com/office/powerpoint/2010/main" val="3244706740"/>
+        <p14:creationId xmlns:p14="http://schemas.microsoft.com/office/powerpoint/2010/main" val="1010036798"/>
       </p:ext>
     </p:extLst>
   </p:cSld>
@@ -13812,6 +14150,397 @@
       </p:grpSpPr>
       <p:sp>
         <p:nvSpPr>
+          <p:cNvPr id="4" name="Title 3"/>
+          <p:cNvSpPr>
+            <a:spLocks noGrp="1"/>
+          </p:cNvSpPr>
+          <p:nvPr>
+            <p:ph type="title"/>
+          </p:nvPr>
+        </p:nvSpPr>
+        <p:spPr>
+          <a:xfrm>
+            <a:off x="831849" y="1709738"/>
+            <a:ext cx="10768479" cy="2852737"/>
+          </a:xfrm>
+        </p:spPr>
+        <p:txBody>
+          <a:bodyPr>
+            <a:noAutofit/>
+          </a:bodyPr>
+          <a:lstStyle/>
+          <a:p>
+            <a:r>
+              <a:rPr lang="en-US" dirty="0" err="1">
+                <a:solidFill>
+                  <a:srgbClr val="7451EB"/>
+                </a:solidFill>
+              </a:rPr>
+              <a:t>Démonstration</a:t>
+            </a:r>
+            <a:r>
+              <a:rPr lang="en-US" dirty="0">
+                <a:solidFill>
+                  <a:srgbClr val="7451EB"/>
+                </a:solidFill>
+              </a:rPr>
+              <a:t> du </a:t>
+            </a:r>
+            <a:r>
+              <a:rPr lang="en-US" i="1" dirty="0">
+                <a:solidFill>
+                  <a:srgbClr val="7451EB"/>
+                </a:solidFill>
+              </a:rPr>
+              <a:t>dashboard</a:t>
+            </a:r>
+          </a:p>
+        </p:txBody>
+      </p:sp>
+      <p:sp>
+        <p:nvSpPr>
+          <p:cNvPr id="5" name="Text Placeholder 4"/>
+          <p:cNvSpPr>
+            <a:spLocks noGrp="1"/>
+          </p:cNvSpPr>
+          <p:nvPr>
+            <p:ph type="body" sz="quarter" idx="14"/>
+          </p:nvPr>
+        </p:nvSpPr>
+        <p:spPr/>
+        <p:txBody>
+          <a:bodyPr/>
+          <a:lstStyle/>
+          <a:p>
+            <a:r>
+              <a:rPr lang="en-US" dirty="0">
+                <a:solidFill>
+                  <a:srgbClr val="7451EB"/>
+                </a:solidFill>
+              </a:rPr>
+              <a:t>05</a:t>
+            </a:r>
+          </a:p>
+        </p:txBody>
+      </p:sp>
+    </p:spTree>
+    <p:extLst>
+      <p:ext uri="{BB962C8B-B14F-4D97-AF65-F5344CB8AC3E}">
+        <p14:creationId xmlns:p14="http://schemas.microsoft.com/office/powerpoint/2010/main" val="1716022605"/>
+      </p:ext>
+    </p:extLst>
+  </p:cSld>
+  <p:clrMapOvr>
+    <a:masterClrMapping/>
+  </p:clrMapOvr>
+</p:sld>
+</file>
+
+<file path=ppt/slides/slide22.xml><?xml version="1.0" encoding="utf-8"?>
+<p:sld xmlns:a="http://schemas.openxmlformats.org/drawingml/2006/main" xmlns:r="http://schemas.openxmlformats.org/officeDocument/2006/relationships" xmlns:p="http://schemas.openxmlformats.org/presentationml/2006/main">
+  <p:cSld>
+    <p:spTree>
+      <p:nvGrpSpPr>
+        <p:cNvPr id="1" name=""/>
+        <p:cNvGrpSpPr/>
+        <p:nvPr/>
+      </p:nvGrpSpPr>
+      <p:grpSpPr>
+        <a:xfrm>
+          <a:off x="0" y="0"/>
+          <a:ext cx="0" cy="0"/>
+          <a:chOff x="0" y="0"/>
+          <a:chExt cx="0" cy="0"/>
+        </a:xfrm>
+      </p:grpSpPr>
+      <p:sp>
+        <p:nvSpPr>
+          <p:cNvPr id="6" name="Title 5"/>
+          <p:cNvSpPr>
+            <a:spLocks noGrp="1"/>
+          </p:cNvSpPr>
+          <p:nvPr>
+            <p:ph type="title"/>
+          </p:nvPr>
+        </p:nvSpPr>
+        <p:spPr>
+          <a:xfrm>
+            <a:off x="838200" y="136525"/>
+            <a:ext cx="10515600" cy="840230"/>
+          </a:xfrm>
+        </p:spPr>
+        <p:txBody>
+          <a:bodyPr/>
+          <a:lstStyle/>
+          <a:p>
+            <a:r>
+              <a:rPr lang="en-US" i="1" dirty="0">
+                <a:solidFill>
+                  <a:srgbClr val="7451EB"/>
+                </a:solidFill>
+              </a:rPr>
+              <a:t>Dashboard</a:t>
+            </a:r>
+            <a:r>
+              <a:rPr lang="en-US" dirty="0">
+                <a:solidFill>
+                  <a:srgbClr val="7451EB"/>
+                </a:solidFill>
+              </a:rPr>
+              <a:t> </a:t>
+            </a:r>
+            <a:r>
+              <a:rPr lang="en-US" dirty="0" err="1">
+                <a:solidFill>
+                  <a:srgbClr val="7451EB"/>
+                </a:solidFill>
+              </a:rPr>
+              <a:t>interactif</a:t>
+            </a:r>
+            <a:r>
+              <a:rPr lang="en-US" dirty="0">
+                <a:solidFill>
+                  <a:srgbClr val="7451EB"/>
+                </a:solidFill>
+              </a:rPr>
+              <a:t> (Azure)</a:t>
+            </a:r>
+            <a:endParaRPr lang="en-US" i="1" dirty="0">
+              <a:solidFill>
+                <a:srgbClr val="7451EB"/>
+              </a:solidFill>
+            </a:endParaRPr>
+          </a:p>
+        </p:txBody>
+      </p:sp>
+      <p:sp>
+        <p:nvSpPr>
+          <p:cNvPr id="3" name="Slide Number Placeholder 2"/>
+          <p:cNvSpPr>
+            <a:spLocks noGrp="1"/>
+          </p:cNvSpPr>
+          <p:nvPr>
+            <p:ph type="sldNum" sz="quarter" idx="12"/>
+          </p:nvPr>
+        </p:nvSpPr>
+        <p:spPr/>
+        <p:txBody>
+          <a:bodyPr/>
+          <a:lstStyle/>
+          <a:p>
+            <a:fld id="{5F0F63B7-4FB4-4E2A-B819-D713A3D928AD}" type="slidenum">
+              <a:rPr lang="en-US" smtClean="0"/>
+              <a:t>22</a:t>
+            </a:fld>
+            <a:endParaRPr lang="en-US" dirty="0"/>
+          </a:p>
+        </p:txBody>
+      </p:sp>
+      <p:sp useBgFill="1">
+        <p:nvSpPr>
+          <p:cNvPr id="5" name="Rectangle 4">
+            <a:extLst>
+              <a:ext uri="{FF2B5EF4-FFF2-40B4-BE49-F238E27FC236}">
+                <a16:creationId xmlns:a16="http://schemas.microsoft.com/office/drawing/2014/main" id="{50832FC2-2811-9BB3-75AD-BD5D3E07CC84}"/>
+              </a:ext>
+            </a:extLst>
+          </p:cNvPr>
+          <p:cNvSpPr/>
+          <p:nvPr/>
+        </p:nvSpPr>
+        <p:spPr>
+          <a:xfrm>
+            <a:off x="7252447" y="6356350"/>
+            <a:ext cx="663388" cy="365125"/>
+          </a:xfrm>
+          <a:prstGeom prst="rect">
+            <a:avLst/>
+          </a:prstGeom>
+          <a:ln>
+            <a:noFill/>
+          </a:ln>
+        </p:spPr>
+        <p:style>
+          <a:lnRef idx="2">
+            <a:schemeClr val="accent1">
+              <a:shade val="50000"/>
+            </a:schemeClr>
+          </a:lnRef>
+          <a:fillRef idx="1">
+            <a:schemeClr val="accent1"/>
+          </a:fillRef>
+          <a:effectRef idx="0">
+            <a:schemeClr val="accent1"/>
+          </a:effectRef>
+          <a:fontRef idx="minor">
+            <a:schemeClr val="lt1"/>
+          </a:fontRef>
+        </p:style>
+        <p:txBody>
+          <a:bodyPr rtlCol="0" anchor="ctr"/>
+          <a:lstStyle/>
+          <a:p>
+            <a:pPr algn="ctr"/>
+            <a:endParaRPr lang="fr-FR"/>
+          </a:p>
+        </p:txBody>
+      </p:sp>
+      <p:pic>
+        <p:nvPicPr>
+          <p:cNvPr id="8" name="Image 7">
+            <a:extLst>
+              <a:ext uri="{FF2B5EF4-FFF2-40B4-BE49-F238E27FC236}">
+                <a16:creationId xmlns:a16="http://schemas.microsoft.com/office/drawing/2014/main" id="{5056FD3B-7DCC-ED5B-08C3-9FC9BAA274DB}"/>
+              </a:ext>
+            </a:extLst>
+          </p:cNvPr>
+          <p:cNvPicPr>
+            <a:picLocks noChangeAspect="1"/>
+          </p:cNvPicPr>
+          <p:nvPr/>
+        </p:nvPicPr>
+        <p:blipFill>
+          <a:blip r:embed="rId3"/>
+          <a:stretch>
+            <a:fillRect/>
+          </a:stretch>
+        </p:blipFill>
+        <p:spPr>
+          <a:xfrm>
+            <a:off x="1135380" y="1345827"/>
+            <a:ext cx="9921240" cy="4991100"/>
+          </a:xfrm>
+          <a:prstGeom prst="rect">
+            <a:avLst/>
+          </a:prstGeom>
+        </p:spPr>
+      </p:pic>
+    </p:spTree>
+    <p:extLst>
+      <p:ext uri="{BB962C8B-B14F-4D97-AF65-F5344CB8AC3E}">
+        <p14:creationId xmlns:p14="http://schemas.microsoft.com/office/powerpoint/2010/main" val="931819275"/>
+      </p:ext>
+    </p:extLst>
+  </p:cSld>
+  <p:clrMapOvr>
+    <a:masterClrMapping/>
+  </p:clrMapOvr>
+</p:sld>
+</file>
+
+<file path=ppt/slides/slide23.xml><?xml version="1.0" encoding="utf-8"?>
+<p:sld xmlns:a="http://schemas.openxmlformats.org/drawingml/2006/main" xmlns:r="http://schemas.openxmlformats.org/officeDocument/2006/relationships" xmlns:p="http://schemas.openxmlformats.org/presentationml/2006/main">
+  <p:cSld>
+    <p:spTree>
+      <p:nvGrpSpPr>
+        <p:cNvPr id="1" name=""/>
+        <p:cNvGrpSpPr/>
+        <p:nvPr/>
+      </p:nvGrpSpPr>
+      <p:grpSpPr>
+        <a:xfrm>
+          <a:off x="0" y="0"/>
+          <a:ext cx="0" cy="0"/>
+          <a:chOff x="0" y="0"/>
+          <a:chExt cx="0" cy="0"/>
+        </a:xfrm>
+      </p:grpSpPr>
+      <p:sp>
+        <p:nvSpPr>
+          <p:cNvPr id="4" name="Title 3"/>
+          <p:cNvSpPr>
+            <a:spLocks noGrp="1"/>
+          </p:cNvSpPr>
+          <p:nvPr>
+            <p:ph type="title"/>
+          </p:nvPr>
+        </p:nvSpPr>
+        <p:spPr>
+          <a:xfrm>
+            <a:off x="831849" y="1709738"/>
+            <a:ext cx="10768479" cy="2852737"/>
+          </a:xfrm>
+        </p:spPr>
+        <p:txBody>
+          <a:bodyPr>
+            <a:noAutofit/>
+          </a:bodyPr>
+          <a:lstStyle/>
+          <a:p>
+            <a:r>
+              <a:rPr lang="en-US" dirty="0">
+                <a:solidFill>
+                  <a:srgbClr val="7451EB"/>
+                </a:solidFill>
+              </a:rPr>
+              <a:t>Conclusion &amp; perspectives</a:t>
+            </a:r>
+            <a:endParaRPr lang="en-US" i="1" dirty="0">
+              <a:solidFill>
+                <a:srgbClr val="7451EB"/>
+              </a:solidFill>
+            </a:endParaRPr>
+          </a:p>
+        </p:txBody>
+      </p:sp>
+      <p:sp>
+        <p:nvSpPr>
+          <p:cNvPr id="5" name="Text Placeholder 4"/>
+          <p:cNvSpPr>
+            <a:spLocks noGrp="1"/>
+          </p:cNvSpPr>
+          <p:nvPr>
+            <p:ph type="body" sz="quarter" idx="14"/>
+          </p:nvPr>
+        </p:nvSpPr>
+        <p:spPr/>
+        <p:txBody>
+          <a:bodyPr/>
+          <a:lstStyle/>
+          <a:p>
+            <a:r>
+              <a:rPr lang="en-US" dirty="0">
+                <a:solidFill>
+                  <a:srgbClr val="7451EB"/>
+                </a:solidFill>
+              </a:rPr>
+              <a:t>06</a:t>
+            </a:r>
+          </a:p>
+        </p:txBody>
+      </p:sp>
+    </p:spTree>
+    <p:extLst>
+      <p:ext uri="{BB962C8B-B14F-4D97-AF65-F5344CB8AC3E}">
+        <p14:creationId xmlns:p14="http://schemas.microsoft.com/office/powerpoint/2010/main" val="3244706740"/>
+      </p:ext>
+    </p:extLst>
+  </p:cSld>
+  <p:clrMapOvr>
+    <a:masterClrMapping/>
+  </p:clrMapOvr>
+</p:sld>
+</file>
+
+<file path=ppt/slides/slide24.xml><?xml version="1.0" encoding="utf-8"?>
+<p:sld xmlns:a="http://schemas.openxmlformats.org/drawingml/2006/main" xmlns:r="http://schemas.openxmlformats.org/officeDocument/2006/relationships" xmlns:p="http://schemas.openxmlformats.org/presentationml/2006/main">
+  <p:cSld>
+    <p:spTree>
+      <p:nvGrpSpPr>
+        <p:cNvPr id="1" name=""/>
+        <p:cNvGrpSpPr/>
+        <p:nvPr/>
+      </p:nvGrpSpPr>
+      <p:grpSpPr>
+        <a:xfrm>
+          <a:off x="0" y="0"/>
+          <a:ext cx="0" cy="0"/>
+          <a:chOff x="0" y="0"/>
+          <a:chExt cx="0" cy="0"/>
+        </a:xfrm>
+      </p:grpSpPr>
+      <p:sp>
+        <p:nvSpPr>
           <p:cNvPr id="6" name="Title 5"/>
           <p:cNvSpPr>
             <a:spLocks noGrp="1"/>
@@ -13864,7 +14593,7 @@
           <a:p>
             <a:fld id="{5F0F63B7-4FB4-4E2A-B819-D713A3D928AD}" type="slidenum">
               <a:rPr lang="en-US" smtClean="0"/>
-              <a:t>21</a:t>
+              <a:t>24</a:t>
             </a:fld>
             <a:endParaRPr lang="en-US"/>
           </a:p>
@@ -14264,7 +14993,7 @@
 </p:sld>
 </file>
 
-<file path=ppt/slides/slide22.xml><?xml version="1.0" encoding="utf-8"?>
+<file path=ppt/slides/slide25.xml><?xml version="1.0" encoding="utf-8"?>
 <p:sld xmlns:a="http://schemas.openxmlformats.org/drawingml/2006/main" xmlns:r="http://schemas.openxmlformats.org/officeDocument/2006/relationships" xmlns:p="http://schemas.openxmlformats.org/presentationml/2006/main">
   <p:cSld>
     <p:spTree>

</xml_diff>